<commit_message>
sibsutis: dpl: submission finished
</commit_message>
<xml_diff>
--- a/sibsutis/2015/dpl/diploma_submission/diploma_submission_pptx.pptx
+++ b/sibsutis/2015/dpl/diploma_submission/diploma_submission_pptx.pptx
@@ -5,15 +5,20 @@
     <p:sldMasterId id="2147483648" r:id="rId1"/>
   </p:sldMasterIdLst>
   <p:notesMasterIdLst>
-    <p:notesMasterId r:id="rId8"/>
+    <p:notesMasterId r:id="rId13"/>
   </p:notesMasterIdLst>
   <p:sldIdLst>
     <p:sldId id="256" r:id="rId2"/>
-    <p:sldId id="262" r:id="rId3"/>
-    <p:sldId id="270" r:id="rId4"/>
-    <p:sldId id="269" r:id="rId5"/>
-    <p:sldId id="268" r:id="rId6"/>
-    <p:sldId id="267" r:id="rId7"/>
+    <p:sldId id="273" r:id="rId3"/>
+    <p:sldId id="274" r:id="rId4"/>
+    <p:sldId id="276" r:id="rId5"/>
+    <p:sldId id="262" r:id="rId6"/>
+    <p:sldId id="270" r:id="rId7"/>
+    <p:sldId id="271" r:id="rId8"/>
+    <p:sldId id="268" r:id="rId9"/>
+    <p:sldId id="272" r:id="rId10"/>
+    <p:sldId id="277" r:id="rId11"/>
+    <p:sldId id="267" r:id="rId12"/>
   </p:sldIdLst>
   <p:sldSz cx="9144000" cy="6858000" type="screen4x3"/>
   <p:notesSz cx="6858000" cy="9144000"/>
@@ -254,7 +259,7 @@
               <a:pPr>
                 <a:defRPr/>
               </a:pPr>
-              <a:t>16.05.2015</a:t>
+              <a:t>17.05.2015</a:t>
             </a:fld>
             <a:endParaRPr lang="ru-RU"/>
           </a:p>
@@ -767,7 +772,7 @@
               <a:pPr>
                 <a:defRPr/>
               </a:pPr>
-              <a:t>16.05.2015</a:t>
+              <a:t>17.05.2015</a:t>
             </a:fld>
             <a:endParaRPr lang="ru-RU"/>
           </a:p>
@@ -959,7 +964,7 @@
               <a:pPr>
                 <a:defRPr/>
               </a:pPr>
-              <a:t>16.05.2015</a:t>
+              <a:t>17.05.2015</a:t>
             </a:fld>
             <a:endParaRPr lang="ru-RU"/>
           </a:p>
@@ -1161,7 +1166,7 @@
               <a:pPr>
                 <a:defRPr/>
               </a:pPr>
-              <a:t>16.05.2015</a:t>
+              <a:t>17.05.2015</a:t>
             </a:fld>
             <a:endParaRPr lang="ru-RU"/>
           </a:p>
@@ -1374,7 +1379,7 @@
               <a:pPr>
                 <a:defRPr/>
               </a:pPr>
-              <a:t>16.05.2015</a:t>
+              <a:t>17.05.2015</a:t>
             </a:fld>
             <a:endParaRPr lang="ru-RU"/>
           </a:p>
@@ -1644,7 +1649,7 @@
               <a:pPr>
                 <a:defRPr/>
               </a:pPr>
-              <a:t>16.05.2015</a:t>
+              <a:t>17.05.2015</a:t>
             </a:fld>
             <a:endParaRPr lang="ru-RU"/>
           </a:p>
@@ -1959,7 +1964,7 @@
               <a:pPr>
                 <a:defRPr/>
               </a:pPr>
-              <a:t>16.05.2015</a:t>
+              <a:t>17.05.2015</a:t>
             </a:fld>
             <a:endParaRPr lang="ru-RU"/>
           </a:p>
@@ -2408,7 +2413,7 @@
               <a:pPr>
                 <a:defRPr/>
               </a:pPr>
-              <a:t>16.05.2015</a:t>
+              <a:t>17.05.2015</a:t>
             </a:fld>
             <a:endParaRPr lang="ru-RU"/>
           </a:p>
@@ -2553,7 +2558,7 @@
               <a:pPr>
                 <a:defRPr/>
               </a:pPr>
-              <a:t>16.05.2015</a:t>
+              <a:t>17.05.2015</a:t>
             </a:fld>
             <a:endParaRPr lang="ru-RU"/>
           </a:p>
@@ -2670,7 +2675,7 @@
               <a:pPr>
                 <a:defRPr/>
               </a:pPr>
-              <a:t>16.05.2015</a:t>
+              <a:t>17.05.2015</a:t>
             </a:fld>
             <a:endParaRPr lang="ru-RU"/>
           </a:p>
@@ -2969,7 +2974,7 @@
               <a:pPr>
                 <a:defRPr/>
               </a:pPr>
-              <a:t>16.05.2015</a:t>
+              <a:t>17.05.2015</a:t>
             </a:fld>
             <a:endParaRPr lang="ru-RU"/>
           </a:p>
@@ -3247,7 +3252,7 @@
               <a:pPr>
                 <a:defRPr/>
               </a:pPr>
-              <a:t>16.05.2015</a:t>
+              <a:t>17.05.2015</a:t>
             </a:fld>
             <a:endParaRPr lang="ru-RU"/>
           </a:p>
@@ -3503,7 +3508,7 @@
               <a:pPr>
                 <a:defRPr/>
               </a:pPr>
-              <a:t>16.05.2015</a:t>
+              <a:t>17.05.2015</a:t>
             </a:fld>
             <a:endParaRPr lang="ru-RU"/>
           </a:p>
@@ -4546,6 +4551,407 @@
 </p:sld>
 </file>
 
+<file path=ppt/slides/slide10.xml><?xml version="1.0" encoding="utf-8"?>
+<p:sld xmlns:a="http://schemas.openxmlformats.org/drawingml/2006/main" xmlns:r="http://schemas.openxmlformats.org/officeDocument/2006/relationships" xmlns:p="http://schemas.openxmlformats.org/presentationml/2006/main">
+  <p:cSld>
+    <p:spTree>
+      <p:nvGrpSpPr>
+        <p:cNvPr id="1" name=""/>
+        <p:cNvGrpSpPr/>
+        <p:nvPr/>
+      </p:nvGrpSpPr>
+      <p:grpSpPr>
+        <a:xfrm>
+          <a:off x="0" y="0"/>
+          <a:ext cx="0" cy="0"/>
+          <a:chOff x="0" y="0"/>
+          <a:chExt cx="0" cy="0"/>
+        </a:xfrm>
+      </p:grpSpPr>
+      <p:sp>
+        <p:nvSpPr>
+          <p:cNvPr id="2" name="Заголовок 1"/>
+          <p:cNvSpPr>
+            <a:spLocks noGrp="1"/>
+          </p:cNvSpPr>
+          <p:nvPr>
+            <p:ph type="title"/>
+          </p:nvPr>
+        </p:nvSpPr>
+        <p:spPr>
+          <a:xfrm>
+            <a:off x="1285852" y="273050"/>
+            <a:ext cx="6572296" cy="706090"/>
+          </a:xfrm>
+        </p:spPr>
+        <p:txBody>
+          <a:bodyPr/>
+          <a:lstStyle/>
+          <a:p>
+            <a:r>
+              <a:rPr lang="ru-RU" dirty="0" smtClean="0"/>
+              <a:t>Заключение</a:t>
+            </a:r>
+            <a:endParaRPr lang="ru-RU" dirty="0"/>
+          </a:p>
+        </p:txBody>
+      </p:sp>
+      <p:sp>
+        <p:nvSpPr>
+          <p:cNvPr id="4" name="Номер слайда 3"/>
+          <p:cNvSpPr>
+            <a:spLocks noGrp="1"/>
+          </p:cNvSpPr>
+          <p:nvPr>
+            <p:ph type="sldNum" sz="quarter" idx="12"/>
+          </p:nvPr>
+        </p:nvSpPr>
+        <p:spPr/>
+        <p:txBody>
+          <a:bodyPr/>
+          <a:lstStyle/>
+          <a:p>
+            <a:pPr>
+              <a:defRPr/>
+            </a:pPr>
+            <a:fld id="{BB3B5E7F-AE2F-46EF-84F8-F046D8633343}" type="slidenum">
+              <a:rPr lang="ru-RU" smtClean="0"/>
+              <a:pPr>
+                <a:defRPr/>
+              </a:pPr>
+              <a:t>10</a:t>
+            </a:fld>
+            <a:endParaRPr lang="ru-RU" dirty="0"/>
+          </a:p>
+        </p:txBody>
+      </p:sp>
+      <p:sp>
+        <p:nvSpPr>
+          <p:cNvPr id="5" name="TextBox 4"/>
+          <p:cNvSpPr txBox="1"/>
+          <p:nvPr/>
+        </p:nvSpPr>
+        <p:spPr>
+          <a:xfrm>
+            <a:off x="260350" y="1490008"/>
+            <a:ext cx="8623300" cy="4524315"/>
+          </a:xfrm>
+          <a:prstGeom prst="rect">
+            <a:avLst/>
+          </a:prstGeom>
+          <a:noFill/>
+        </p:spPr>
+        <p:txBody>
+          <a:bodyPr wrap="square" rtlCol="0">
+            <a:spAutoFit/>
+          </a:bodyPr>
+          <a:lstStyle/>
+          <a:p>
+            <a:pPr>
+              <a:buFont typeface="Arial" pitchFamily="34" charset="0"/>
+              <a:buChar char="•"/>
+            </a:pPr>
+            <a:r>
+              <a:rPr lang="ru-RU" sz="2400" dirty="0" smtClean="0">
+                <a:latin typeface="+mj-lt"/>
+              </a:rPr>
+              <a:t> Лицензирование </a:t>
+            </a:r>
+            <a:r>
+              <a:rPr lang="ru-RU" sz="2400" dirty="0" smtClean="0">
+                <a:latin typeface="+mj-lt"/>
+              </a:rPr>
+              <a:t>функционала</a:t>
+            </a:r>
+            <a:r>
+              <a:rPr lang="en-US" sz="2400" dirty="0" smtClean="0">
+                <a:latin typeface="+mj-lt"/>
+              </a:rPr>
+              <a:t>;</a:t>
+            </a:r>
+            <a:endParaRPr lang="ru-RU" sz="2400" dirty="0" smtClean="0">
+              <a:latin typeface="+mj-lt"/>
+            </a:endParaRPr>
+          </a:p>
+          <a:p>
+            <a:pPr>
+              <a:buFont typeface="Arial" pitchFamily="34" charset="0"/>
+              <a:buChar char="•"/>
+            </a:pPr>
+            <a:endParaRPr lang="ru-RU" sz="2400" dirty="0" smtClean="0">
+              <a:latin typeface="+mj-lt"/>
+            </a:endParaRPr>
+          </a:p>
+          <a:p>
+            <a:pPr>
+              <a:buFont typeface="Arial" pitchFamily="34" charset="0"/>
+              <a:buChar char="•"/>
+            </a:pPr>
+            <a:r>
+              <a:rPr lang="ru-RU" sz="2400" dirty="0" smtClean="0">
+                <a:latin typeface="+mj-lt"/>
+              </a:rPr>
+              <a:t> Успешно пройдено тестирование в 40+ компаниях</a:t>
+            </a:r>
+            <a:r>
+              <a:rPr lang="en-US" sz="2400" dirty="0" smtClean="0">
+                <a:latin typeface="+mj-lt"/>
+              </a:rPr>
+              <a:t>;</a:t>
+            </a:r>
+            <a:endParaRPr lang="ru-RU" sz="2400" dirty="0" smtClean="0">
+              <a:latin typeface="+mj-lt"/>
+            </a:endParaRPr>
+          </a:p>
+          <a:p>
+            <a:pPr>
+              <a:buFont typeface="Arial" pitchFamily="34" charset="0"/>
+              <a:buChar char="•"/>
+            </a:pPr>
+            <a:endParaRPr lang="ru-RU" sz="2400" dirty="0" smtClean="0">
+              <a:latin typeface="+mj-lt"/>
+            </a:endParaRPr>
+          </a:p>
+          <a:p>
+            <a:pPr>
+              <a:buFont typeface="Arial" pitchFamily="34" charset="0"/>
+              <a:buChar char="•"/>
+            </a:pPr>
+            <a:r>
+              <a:rPr lang="ru-RU" sz="2400" dirty="0" smtClean="0">
+                <a:latin typeface="+mj-lt"/>
+              </a:rPr>
+              <a:t>Поддержка цифровой и аналоговой сигнализации</a:t>
+            </a:r>
+          </a:p>
+          <a:p>
+            <a:r>
+              <a:rPr lang="ru-RU" sz="2400" dirty="0" smtClean="0">
+                <a:latin typeface="+mj-lt"/>
+              </a:rPr>
+              <a:t>  </a:t>
+            </a:r>
+            <a:r>
+              <a:rPr lang="en-US" sz="2400" dirty="0" smtClean="0">
+                <a:latin typeface="+mj-lt"/>
+              </a:rPr>
+              <a:t>(SIP</a:t>
+            </a:r>
+            <a:r>
+              <a:rPr lang="ru-RU" sz="2400" dirty="0" smtClean="0">
+                <a:latin typeface="+mj-lt"/>
+              </a:rPr>
+              <a:t>, </a:t>
+            </a:r>
+            <a:r>
+              <a:rPr lang="en-US" sz="2400" dirty="0" smtClean="0">
+                <a:latin typeface="+mj-lt"/>
+              </a:rPr>
+              <a:t>H.323, PRI, SS7</a:t>
+            </a:r>
+            <a:r>
+              <a:rPr lang="en-US" sz="2400" dirty="0" smtClean="0">
+                <a:latin typeface="+mj-lt"/>
+              </a:rPr>
+              <a:t>);</a:t>
+            </a:r>
+            <a:endParaRPr lang="ru-RU" sz="2400" dirty="0" smtClean="0">
+              <a:latin typeface="+mj-lt"/>
+            </a:endParaRPr>
+          </a:p>
+          <a:p>
+            <a:endParaRPr lang="ru-RU" sz="2400" dirty="0" smtClean="0">
+              <a:latin typeface="+mj-lt"/>
+            </a:endParaRPr>
+          </a:p>
+          <a:p>
+            <a:pPr>
+              <a:buFont typeface="Arial" pitchFamily="34" charset="0"/>
+              <a:buChar char="•"/>
+            </a:pPr>
+            <a:r>
+              <a:rPr lang="ru-RU" sz="2400" dirty="0" smtClean="0">
+                <a:latin typeface="+mj-lt"/>
+              </a:rPr>
+              <a:t> Готовое </a:t>
+            </a:r>
+            <a:r>
+              <a:rPr lang="ru-RU" sz="2400" dirty="0" smtClean="0">
+                <a:latin typeface="+mj-lt"/>
+              </a:rPr>
+              <a:t>решения на базе </a:t>
+            </a:r>
+            <a:r>
+              <a:rPr lang="ru-RU" sz="2400" dirty="0" err="1" smtClean="0">
+                <a:latin typeface="+mj-lt"/>
+              </a:rPr>
+              <a:t>транковых</a:t>
+            </a:r>
+            <a:r>
+              <a:rPr lang="ru-RU" sz="2400" dirty="0" smtClean="0">
+                <a:latin typeface="+mj-lt"/>
+              </a:rPr>
+              <a:t> шлюзов </a:t>
+            </a:r>
+            <a:r>
+              <a:rPr lang="en-US" sz="2400" dirty="0" smtClean="0">
+                <a:latin typeface="+mj-lt"/>
+              </a:rPr>
+              <a:t>SMG</a:t>
+            </a:r>
+            <a:r>
+              <a:rPr lang="ru-RU" sz="2400" dirty="0" smtClean="0">
+                <a:latin typeface="+mj-lt"/>
+              </a:rPr>
+              <a:t> </a:t>
+            </a:r>
+            <a:r>
+              <a:rPr lang="ru-RU" sz="2400" dirty="0" smtClean="0">
+                <a:latin typeface="+mj-lt"/>
+              </a:rPr>
+              <a:t>для</a:t>
+            </a:r>
+          </a:p>
+          <a:p>
+            <a:r>
+              <a:rPr lang="ru-RU" sz="2400" dirty="0" smtClean="0">
+                <a:latin typeface="+mj-lt"/>
+              </a:rPr>
+              <a:t> </a:t>
+            </a:r>
+            <a:r>
+              <a:rPr lang="ru-RU" sz="2400" dirty="0" smtClean="0">
+                <a:latin typeface="+mj-lt"/>
+              </a:rPr>
+              <a:t> </a:t>
+            </a:r>
+            <a:r>
+              <a:rPr lang="ru-RU" sz="2400" dirty="0" smtClean="0">
+                <a:latin typeface="+mj-lt"/>
+              </a:rPr>
+              <a:t>интеграция в сети </a:t>
+            </a:r>
+            <a:r>
+              <a:rPr lang="en-US" sz="2400" dirty="0" smtClean="0">
+                <a:latin typeface="+mj-lt"/>
+              </a:rPr>
+              <a:t>NGN;</a:t>
+            </a:r>
+            <a:endParaRPr lang="ru-RU" sz="2400" dirty="0" smtClean="0">
+              <a:latin typeface="+mj-lt"/>
+            </a:endParaRPr>
+          </a:p>
+          <a:p>
+            <a:endParaRPr lang="ru-RU" sz="2400" dirty="0" smtClean="0">
+              <a:latin typeface="+mj-lt"/>
+            </a:endParaRPr>
+          </a:p>
+          <a:p>
+            <a:pPr>
+              <a:buFont typeface="Arial" pitchFamily="34" charset="0"/>
+              <a:buChar char="•"/>
+            </a:pPr>
+            <a:r>
+              <a:rPr lang="ru-RU" sz="2400" dirty="0" smtClean="0">
+                <a:latin typeface="+mj-lt"/>
+              </a:rPr>
+              <a:t> Возможность расширения функционала с учетом отзывов и </a:t>
+            </a:r>
+          </a:p>
+          <a:p>
+            <a:r>
+              <a:rPr lang="ru-RU" sz="2400" dirty="0" smtClean="0">
+                <a:latin typeface="+mj-lt"/>
+              </a:rPr>
+              <a:t>  пожеланий клиентов</a:t>
+            </a:r>
+            <a:r>
+              <a:rPr lang="en-US" sz="2400" dirty="0" smtClean="0">
+                <a:latin typeface="+mj-lt"/>
+              </a:rPr>
+              <a:t>.</a:t>
+            </a:r>
+            <a:endParaRPr lang="ru-RU" sz="2400" dirty="0">
+              <a:latin typeface="+mj-lt"/>
+            </a:endParaRPr>
+          </a:p>
+        </p:txBody>
+      </p:sp>
+    </p:spTree>
+  </p:cSld>
+  <p:clrMapOvr>
+    <a:masterClrMapping/>
+  </p:clrMapOvr>
+  <p:timing>
+    <p:tnLst>
+      <p:par>
+        <p:cTn id="1" dur="indefinite" restart="never" nodeType="tmRoot"/>
+      </p:par>
+    </p:tnLst>
+  </p:timing>
+</p:sld>
+</file>
+
+<file path=ppt/slides/slide11.xml><?xml version="1.0" encoding="utf-8"?>
+<p:sld xmlns:a="http://schemas.openxmlformats.org/drawingml/2006/main" xmlns:r="http://schemas.openxmlformats.org/officeDocument/2006/relationships" xmlns:p="http://schemas.openxmlformats.org/presentationml/2006/main">
+  <p:cSld>
+    <p:spTree>
+      <p:nvGrpSpPr>
+        <p:cNvPr id="1" name=""/>
+        <p:cNvGrpSpPr/>
+        <p:nvPr/>
+      </p:nvGrpSpPr>
+      <p:grpSpPr>
+        <a:xfrm>
+          <a:off x="0" y="0"/>
+          <a:ext cx="0" cy="0"/>
+          <a:chOff x="0" y="0"/>
+          <a:chExt cx="0" cy="0"/>
+        </a:xfrm>
+      </p:grpSpPr>
+      <p:sp>
+        <p:nvSpPr>
+          <p:cNvPr id="2" name="Заголовок 1"/>
+          <p:cNvSpPr>
+            <a:spLocks noGrp="1"/>
+          </p:cNvSpPr>
+          <p:nvPr>
+            <p:ph type="ctrTitle"/>
+          </p:nvPr>
+        </p:nvSpPr>
+        <p:spPr>
+          <a:xfrm>
+            <a:off x="685800" y="2535039"/>
+            <a:ext cx="7772400" cy="1470025"/>
+          </a:xfrm>
+        </p:spPr>
+        <p:txBody>
+          <a:bodyPr/>
+          <a:lstStyle/>
+          <a:p>
+            <a:r>
+              <a:rPr lang="ru-RU" dirty="0" smtClean="0"/>
+              <a:t>СПАСИБО ЗА ВНИМАНИЕ!</a:t>
+            </a:r>
+            <a:endParaRPr lang="ru-RU" dirty="0"/>
+          </a:p>
+        </p:txBody>
+      </p:sp>
+    </p:spTree>
+  </p:cSld>
+  <p:clrMapOvr>
+    <a:masterClrMapping/>
+  </p:clrMapOvr>
+  <p:timing>
+    <p:tnLst>
+      <p:par>
+        <p:cTn id="1" dur="indefinite" restart="never" nodeType="tmRoot"/>
+      </p:par>
+    </p:tnLst>
+  </p:timing>
+</p:sld>
+</file>
+
 <file path=ppt/slides/slide2.xml><?xml version="1.0" encoding="utf-8"?>
 <p:sld xmlns:a="http://schemas.openxmlformats.org/drawingml/2006/main" xmlns:r="http://schemas.openxmlformats.org/officeDocument/2006/relationships" xmlns:p="http://schemas.openxmlformats.org/presentationml/2006/main">
   <p:cSld>
@@ -4565,6 +4971,34 @@
       </p:grpSpPr>
       <p:sp>
         <p:nvSpPr>
+          <p:cNvPr id="2" name="Заголовок 1"/>
+          <p:cNvSpPr>
+            <a:spLocks noGrp="1"/>
+          </p:cNvSpPr>
+          <p:nvPr>
+            <p:ph type="title"/>
+          </p:nvPr>
+        </p:nvSpPr>
+        <p:spPr>
+          <a:xfrm>
+            <a:off x="1285852" y="500042"/>
+            <a:ext cx="6572296" cy="706090"/>
+          </a:xfrm>
+        </p:spPr>
+        <p:txBody>
+          <a:bodyPr/>
+          <a:lstStyle/>
+          <a:p>
+            <a:r>
+              <a:rPr lang="ru-RU" dirty="0" smtClean="0"/>
+              <a:t>Интерактивное Голосовое Меню (IVR)</a:t>
+            </a:r>
+            <a:endParaRPr lang="ru-RU" dirty="0"/>
+          </a:p>
+        </p:txBody>
+      </p:sp>
+      <p:sp>
+        <p:nvSpPr>
           <p:cNvPr id="4" name="Номер слайда 3"/>
           <p:cNvSpPr>
             <a:spLocks noGrp="1"/>
@@ -4594,30 +5028,69 @@
       </p:sp>
       <p:sp>
         <p:nvSpPr>
-          <p:cNvPr id="5" name="Заголовок 4"/>
-          <p:cNvSpPr>
-            <a:spLocks noGrp="1"/>
-          </p:cNvSpPr>
-          <p:nvPr>
-            <p:ph type="title"/>
-          </p:nvPr>
-        </p:nvSpPr>
-        <p:spPr/>
-        <p:txBody>
-          <a:bodyPr/>
+          <p:cNvPr id="6" name="TextBox 5"/>
+          <p:cNvSpPr txBox="1"/>
+          <p:nvPr/>
+        </p:nvSpPr>
+        <p:spPr>
+          <a:xfrm>
+            <a:off x="214282" y="1428736"/>
+            <a:ext cx="8929718" cy="1569660"/>
+          </a:xfrm>
+          <a:prstGeom prst="rect">
+            <a:avLst/>
+          </a:prstGeom>
+          <a:noFill/>
+        </p:spPr>
+        <p:txBody>
+          <a:bodyPr wrap="square" rtlCol="0">
+            <a:spAutoFit/>
+          </a:bodyPr>
           <a:lstStyle/>
           <a:p>
             <a:r>
-              <a:rPr lang="ru-RU" sz="4400" dirty="0" smtClean="0"/>
-              <a:t>Функциональные блоки</a:t>
-            </a:r>
-            <a:endParaRPr lang="ru-RU" sz="4400" dirty="0"/>
+              <a:rPr lang="ru-RU" sz="2400" dirty="0" smtClean="0">
+                <a:latin typeface="+mn-lt"/>
+              </a:rPr>
+              <a:t>Интерактивное Голосовое Меню </a:t>
+            </a:r>
+            <a:r>
+              <a:rPr lang="ru-RU" sz="2400" dirty="0" smtClean="0"/>
+              <a:t> </a:t>
+            </a:r>
+            <a:r>
+              <a:rPr lang="ru-RU" sz="2400" dirty="0" smtClean="0">
+                <a:latin typeface="+mj-lt"/>
+              </a:rPr>
+              <a:t>(англ. </a:t>
+            </a:r>
+            <a:r>
+              <a:rPr lang="en-US" sz="2400" i="1" dirty="0" smtClean="0">
+                <a:latin typeface="+mj-lt"/>
+              </a:rPr>
+              <a:t>Interactive Voice Response</a:t>
+            </a:r>
+            <a:r>
+              <a:rPr lang="en-US" sz="2400" dirty="0" smtClean="0">
+                <a:latin typeface="+mj-lt"/>
+              </a:rPr>
+              <a:t>)</a:t>
+            </a:r>
+            <a:r>
+              <a:rPr lang="ru-RU" sz="2400" dirty="0" smtClean="0">
+                <a:latin typeface="+mn-lt"/>
+              </a:rPr>
+              <a:t> — это система предварительно записанных голосовых сообщений, выполняющая функцию маршрутизации звонков, пользуясь информацией, вводимой клиентом с помощью тонального набора.</a:t>
+            </a:r>
+            <a:endParaRPr lang="ru-RU" sz="2400" dirty="0">
+              <a:latin typeface="+mn-lt"/>
+            </a:endParaRPr>
           </a:p>
         </p:txBody>
       </p:sp>
       <p:pic>
         <p:nvPicPr>
-          <p:cNvPr id="3081" name="Picture 9" descr="C:\Users\Notebook\Desktop\tunel\sibsutis\2015\dpl\diploma_submission\ываываывай23кейцаусывав.png"/>
+          <p:cNvPr id="1028" name="Picture 4" descr="C:\Users\Notebook\Desktop\tunel\sibsutis\2015\dpl\diploma_submission\ivr_en.png"/>
           <p:cNvPicPr>
             <a:picLocks noChangeAspect="1" noChangeArrowheads="1"/>
           </p:cNvPicPr>
@@ -4632,8 +5105,8 @@
         </p:blipFill>
         <p:spPr bwMode="auto">
           <a:xfrm>
-            <a:off x="240964" y="2143116"/>
-            <a:ext cx="8662072" cy="3429024"/>
+            <a:off x="1178695" y="3000372"/>
+            <a:ext cx="6786610" cy="3610739"/>
           </a:xfrm>
           <a:prstGeom prst="rect">
             <a:avLst/>
@@ -4675,70 +5148,64 @@
       </p:grpSpPr>
       <p:sp>
         <p:nvSpPr>
-          <p:cNvPr id="2" name="Номер слайда 1"/>
-          <p:cNvSpPr>
-            <a:spLocks noGrp="1"/>
-          </p:cNvSpPr>
-          <p:nvPr>
-            <p:ph type="sldNum" sz="quarter" idx="12"/>
-          </p:nvPr>
-        </p:nvSpPr>
-        <p:spPr/>
+          <p:cNvPr id="2" name="Заголовок 1"/>
+          <p:cNvSpPr>
+            <a:spLocks noGrp="1"/>
+          </p:cNvSpPr>
+          <p:nvPr>
+            <p:ph type="title"/>
+          </p:nvPr>
+        </p:nvSpPr>
+        <p:spPr>
+          <a:xfrm>
+            <a:off x="1285852" y="273050"/>
+            <a:ext cx="6572296" cy="706090"/>
+          </a:xfrm>
+        </p:spPr>
         <p:txBody>
           <a:bodyPr/>
           <a:lstStyle/>
           <a:p>
+            <a:r>
+              <a:rPr lang="ru-RU" dirty="0" smtClean="0"/>
+              <a:t>Снижение нагрузки на операторов</a:t>
+            </a:r>
+            <a:endParaRPr lang="ru-RU" dirty="0"/>
+          </a:p>
+        </p:txBody>
+      </p:sp>
+      <p:sp>
+        <p:nvSpPr>
+          <p:cNvPr id="4" name="Номер слайда 3"/>
+          <p:cNvSpPr>
+            <a:spLocks noGrp="1"/>
+          </p:cNvSpPr>
+          <p:nvPr>
+            <p:ph type="sldNum" sz="quarter" idx="12"/>
+          </p:nvPr>
+        </p:nvSpPr>
+        <p:spPr/>
+        <p:txBody>
+          <a:bodyPr/>
+          <a:lstStyle/>
+          <a:p>
             <a:pPr>
               <a:defRPr/>
             </a:pPr>
-            <a:fld id="{F8C2C083-5B1A-449D-8928-55AB4BD89302}" type="slidenum">
+            <a:fld id="{BB3B5E7F-AE2F-46EF-84F8-F046D8633343}" type="slidenum">
               <a:rPr lang="ru-RU" smtClean="0"/>
               <a:pPr>
                 <a:defRPr/>
               </a:pPr>
               <a:t>3</a:t>
             </a:fld>
-            <a:endParaRPr lang="ru-RU"/>
-          </a:p>
-        </p:txBody>
-      </p:sp>
-      <p:sp>
-        <p:nvSpPr>
-          <p:cNvPr id="13" name="TextBox 12"/>
-          <p:cNvSpPr txBox="1"/>
-          <p:nvPr/>
-        </p:nvSpPr>
-        <p:spPr>
-          <a:xfrm>
-            <a:off x="1780339" y="214290"/>
-            <a:ext cx="5583323" cy="769441"/>
-          </a:xfrm>
-          <a:prstGeom prst="rect">
-            <a:avLst/>
-          </a:prstGeom>
-          <a:noFill/>
-        </p:spPr>
-        <p:txBody>
-          <a:bodyPr wrap="square" rtlCol="0">
-            <a:spAutoFit/>
-          </a:bodyPr>
-          <a:lstStyle/>
-          <a:p>
-            <a:r>
-              <a:rPr lang="ru-RU" sz="4400" dirty="0" smtClean="0">
-                <a:latin typeface="+mj-lt"/>
-              </a:rPr>
-              <a:t>Взаимодействие слоёв</a:t>
-            </a:r>
-            <a:endParaRPr lang="ru-RU" sz="4400" dirty="0">
-              <a:latin typeface="+mj-lt"/>
-            </a:endParaRPr>
+            <a:endParaRPr lang="ru-RU" dirty="0"/>
           </a:p>
         </p:txBody>
       </p:sp>
       <p:pic>
         <p:nvPicPr>
-          <p:cNvPr id="1032" name="Picture 8" descr="C:\Users\Notebook\Desktop\tunel\sibsutis\2015\dpl\diploma_submission\Неназванная Диаграмма.png"/>
+          <p:cNvPr id="3077" name="Picture 5" descr="C:\Users\Notebook\Desktop\tunel\sibsutis\2015\dpl\diploma_submission\sadg.png"/>
           <p:cNvPicPr>
             <a:picLocks noChangeAspect="1" noChangeArrowheads="1"/>
           </p:cNvPicPr>
@@ -4753,8 +5220,584 @@
         </p:blipFill>
         <p:spPr bwMode="auto">
           <a:xfrm>
-            <a:off x="285720" y="1142984"/>
-            <a:ext cx="8572560" cy="5131319"/>
+            <a:off x="5357818" y="1285860"/>
+            <a:ext cx="2717800" cy="3581400"/>
+          </a:xfrm>
+          <a:prstGeom prst="rect">
+            <a:avLst/>
+          </a:prstGeom>
+          <a:noFill/>
+        </p:spPr>
+      </p:pic>
+      <p:pic>
+        <p:nvPicPr>
+          <p:cNvPr id="3078" name="Picture 6" descr="C:\Users\Notebook\Desktop\tunel\sibsutis\2015\dpl\diploma_submission\sadg (1).png"/>
+          <p:cNvPicPr>
+            <a:picLocks noChangeAspect="1" noChangeArrowheads="1"/>
+          </p:cNvPicPr>
+          <p:nvPr/>
+        </p:nvPicPr>
+        <p:blipFill>
+          <a:blip r:embed="rId3"/>
+          <a:srcRect/>
+          <a:stretch>
+            <a:fillRect/>
+          </a:stretch>
+        </p:blipFill>
+        <p:spPr bwMode="auto">
+          <a:xfrm>
+            <a:off x="1071538" y="1285860"/>
+            <a:ext cx="2717800" cy="3581400"/>
+          </a:xfrm>
+          <a:prstGeom prst="rect">
+            <a:avLst/>
+          </a:prstGeom>
+          <a:noFill/>
+        </p:spPr>
+      </p:pic>
+      <p:pic>
+        <p:nvPicPr>
+          <p:cNvPr id="3079" name="Picture 7" descr="C:\Users\Notebook\Desktop\tunel\sibsutis\2015\dpl\diploma_submission\CallCenterOperator.png"/>
+          <p:cNvPicPr>
+            <a:picLocks noChangeAspect="1" noChangeArrowheads="1"/>
+          </p:cNvPicPr>
+          <p:nvPr/>
+        </p:nvPicPr>
+        <p:blipFill>
+          <a:blip r:embed="rId4"/>
+          <a:srcRect/>
+          <a:stretch>
+            <a:fillRect/>
+          </a:stretch>
+        </p:blipFill>
+        <p:spPr bwMode="auto">
+          <a:xfrm>
+            <a:off x="5286380" y="4929198"/>
+            <a:ext cx="785818" cy="785818"/>
+          </a:xfrm>
+          <a:prstGeom prst="rect">
+            <a:avLst/>
+          </a:prstGeom>
+          <a:noFill/>
+        </p:spPr>
+      </p:pic>
+      <p:pic>
+        <p:nvPicPr>
+          <p:cNvPr id="84" name="Picture 7" descr="C:\Users\Notebook\Desktop\tunel\sibsutis\2015\dpl\diploma_submission\CallCenterOperator.png"/>
+          <p:cNvPicPr>
+            <a:picLocks noChangeAspect="1" noChangeArrowheads="1"/>
+          </p:cNvPicPr>
+          <p:nvPr/>
+        </p:nvPicPr>
+        <p:blipFill>
+          <a:blip r:embed="rId4"/>
+          <a:srcRect/>
+          <a:stretch>
+            <a:fillRect/>
+          </a:stretch>
+        </p:blipFill>
+        <p:spPr bwMode="auto">
+          <a:xfrm>
+            <a:off x="6000760" y="4929198"/>
+            <a:ext cx="785818" cy="785818"/>
+          </a:xfrm>
+          <a:prstGeom prst="rect">
+            <a:avLst/>
+          </a:prstGeom>
+          <a:noFill/>
+        </p:spPr>
+      </p:pic>
+      <p:pic>
+        <p:nvPicPr>
+          <p:cNvPr id="85" name="Picture 7" descr="C:\Users\Notebook\Desktop\tunel\sibsutis\2015\dpl\diploma_submission\CallCenterOperator.png"/>
+          <p:cNvPicPr>
+            <a:picLocks noChangeAspect="1" noChangeArrowheads="1"/>
+          </p:cNvPicPr>
+          <p:nvPr/>
+        </p:nvPicPr>
+        <p:blipFill>
+          <a:blip r:embed="rId4"/>
+          <a:srcRect/>
+          <a:stretch>
+            <a:fillRect/>
+          </a:stretch>
+        </p:blipFill>
+        <p:spPr bwMode="auto">
+          <a:xfrm>
+            <a:off x="6715140" y="4929198"/>
+            <a:ext cx="785818" cy="785818"/>
+          </a:xfrm>
+          <a:prstGeom prst="rect">
+            <a:avLst/>
+          </a:prstGeom>
+          <a:noFill/>
+        </p:spPr>
+      </p:pic>
+      <p:pic>
+        <p:nvPicPr>
+          <p:cNvPr id="86" name="Picture 7" descr="C:\Users\Notebook\Desktop\tunel\sibsutis\2015\dpl\diploma_submission\CallCenterOperator.png"/>
+          <p:cNvPicPr>
+            <a:picLocks noChangeAspect="1" noChangeArrowheads="1"/>
+          </p:cNvPicPr>
+          <p:nvPr/>
+        </p:nvPicPr>
+        <p:blipFill>
+          <a:blip r:embed="rId4"/>
+          <a:srcRect/>
+          <a:stretch>
+            <a:fillRect/>
+          </a:stretch>
+        </p:blipFill>
+        <p:spPr bwMode="auto">
+          <a:xfrm>
+            <a:off x="7358082" y="4929198"/>
+            <a:ext cx="785818" cy="785818"/>
+          </a:xfrm>
+          <a:prstGeom prst="rect">
+            <a:avLst/>
+          </a:prstGeom>
+          <a:noFill/>
+        </p:spPr>
+      </p:pic>
+      <p:pic>
+        <p:nvPicPr>
+          <p:cNvPr id="87" name="Picture 7" descr="C:\Users\Notebook\Desktop\tunel\sibsutis\2015\dpl\diploma_submission\CallCenterOperator.png"/>
+          <p:cNvPicPr>
+            <a:picLocks noChangeAspect="1" noChangeArrowheads="1"/>
+          </p:cNvPicPr>
+          <p:nvPr/>
+        </p:nvPicPr>
+        <p:blipFill>
+          <a:blip r:embed="rId4"/>
+          <a:srcRect/>
+          <a:stretch>
+            <a:fillRect/>
+          </a:stretch>
+        </p:blipFill>
+        <p:spPr bwMode="auto">
+          <a:xfrm>
+            <a:off x="857224" y="4857760"/>
+            <a:ext cx="785818" cy="785818"/>
+          </a:xfrm>
+          <a:prstGeom prst="rect">
+            <a:avLst/>
+          </a:prstGeom>
+          <a:noFill/>
+        </p:spPr>
+      </p:pic>
+      <p:pic>
+        <p:nvPicPr>
+          <p:cNvPr id="88" name="Picture 7" descr="C:\Users\Notebook\Desktop\tunel\sibsutis\2015\dpl\diploma_submission\CallCenterOperator.png"/>
+          <p:cNvPicPr>
+            <a:picLocks noChangeAspect="1" noChangeArrowheads="1"/>
+          </p:cNvPicPr>
+          <p:nvPr/>
+        </p:nvPicPr>
+        <p:blipFill>
+          <a:blip r:embed="rId4"/>
+          <a:srcRect/>
+          <a:stretch>
+            <a:fillRect/>
+          </a:stretch>
+        </p:blipFill>
+        <p:spPr bwMode="auto">
+          <a:xfrm>
+            <a:off x="1571604" y="4857760"/>
+            <a:ext cx="785818" cy="785818"/>
+          </a:xfrm>
+          <a:prstGeom prst="rect">
+            <a:avLst/>
+          </a:prstGeom>
+          <a:noFill/>
+        </p:spPr>
+      </p:pic>
+      <p:pic>
+        <p:nvPicPr>
+          <p:cNvPr id="89" name="Picture 7" descr="C:\Users\Notebook\Desktop\tunel\sibsutis\2015\dpl\diploma_submission\CallCenterOperator.png"/>
+          <p:cNvPicPr>
+            <a:picLocks noChangeAspect="1" noChangeArrowheads="1"/>
+          </p:cNvPicPr>
+          <p:nvPr/>
+        </p:nvPicPr>
+        <p:blipFill>
+          <a:blip r:embed="rId4"/>
+          <a:srcRect/>
+          <a:stretch>
+            <a:fillRect/>
+          </a:stretch>
+        </p:blipFill>
+        <p:spPr bwMode="auto">
+          <a:xfrm>
+            <a:off x="2428860" y="4857760"/>
+            <a:ext cx="785818" cy="785818"/>
+          </a:xfrm>
+          <a:prstGeom prst="rect">
+            <a:avLst/>
+          </a:prstGeom>
+          <a:noFill/>
+        </p:spPr>
+      </p:pic>
+      <p:pic>
+        <p:nvPicPr>
+          <p:cNvPr id="90" name="Picture 7" descr="C:\Users\Notebook\Desktop\tunel\sibsutis\2015\dpl\diploma_submission\CallCenterOperator.png"/>
+          <p:cNvPicPr>
+            <a:picLocks noChangeAspect="1" noChangeArrowheads="1"/>
+          </p:cNvPicPr>
+          <p:nvPr/>
+        </p:nvPicPr>
+        <p:blipFill>
+          <a:blip r:embed="rId4"/>
+          <a:srcRect/>
+          <a:stretch>
+            <a:fillRect/>
+          </a:stretch>
+        </p:blipFill>
+        <p:spPr bwMode="auto">
+          <a:xfrm>
+            <a:off x="3143240" y="4857760"/>
+            <a:ext cx="785818" cy="785818"/>
+          </a:xfrm>
+          <a:prstGeom prst="rect">
+            <a:avLst/>
+          </a:prstGeom>
+          <a:noFill/>
+        </p:spPr>
+      </p:pic>
+      <p:pic>
+        <p:nvPicPr>
+          <p:cNvPr id="91" name="Picture 7" descr="C:\Users\Notebook\Desktop\tunel\sibsutis\2015\dpl\diploma_submission\CallCenterOperator.png"/>
+          <p:cNvPicPr>
+            <a:picLocks noChangeAspect="1" noChangeArrowheads="1"/>
+          </p:cNvPicPr>
+          <p:nvPr/>
+        </p:nvPicPr>
+        <p:blipFill>
+          <a:blip r:embed="rId4"/>
+          <a:srcRect/>
+          <a:stretch>
+            <a:fillRect/>
+          </a:stretch>
+        </p:blipFill>
+        <p:spPr bwMode="auto">
+          <a:xfrm>
+            <a:off x="1214414" y="5643578"/>
+            <a:ext cx="785818" cy="785818"/>
+          </a:xfrm>
+          <a:prstGeom prst="rect">
+            <a:avLst/>
+          </a:prstGeom>
+          <a:noFill/>
+        </p:spPr>
+      </p:pic>
+      <p:pic>
+        <p:nvPicPr>
+          <p:cNvPr id="92" name="Picture 7" descr="C:\Users\Notebook\Desktop\tunel\sibsutis\2015\dpl\diploma_submission\CallCenterOperator.png"/>
+          <p:cNvPicPr>
+            <a:picLocks noChangeAspect="1" noChangeArrowheads="1"/>
+          </p:cNvPicPr>
+          <p:nvPr/>
+        </p:nvPicPr>
+        <p:blipFill>
+          <a:blip r:embed="rId4"/>
+          <a:srcRect/>
+          <a:stretch>
+            <a:fillRect/>
+          </a:stretch>
+        </p:blipFill>
+        <p:spPr bwMode="auto">
+          <a:xfrm>
+            <a:off x="2000232" y="5643578"/>
+            <a:ext cx="785818" cy="785818"/>
+          </a:xfrm>
+          <a:prstGeom prst="rect">
+            <a:avLst/>
+          </a:prstGeom>
+          <a:noFill/>
+        </p:spPr>
+      </p:pic>
+      <p:pic>
+        <p:nvPicPr>
+          <p:cNvPr id="93" name="Picture 7" descr="C:\Users\Notebook\Desktop\tunel\sibsutis\2015\dpl\diploma_submission\CallCenterOperator.png"/>
+          <p:cNvPicPr>
+            <a:picLocks noChangeAspect="1" noChangeArrowheads="1"/>
+          </p:cNvPicPr>
+          <p:nvPr/>
+        </p:nvPicPr>
+        <p:blipFill>
+          <a:blip r:embed="rId4"/>
+          <a:srcRect/>
+          <a:stretch>
+            <a:fillRect/>
+          </a:stretch>
+        </p:blipFill>
+        <p:spPr bwMode="auto">
+          <a:xfrm>
+            <a:off x="2786050" y="5643578"/>
+            <a:ext cx="785818" cy="785818"/>
+          </a:xfrm>
+          <a:prstGeom prst="rect">
+            <a:avLst/>
+          </a:prstGeom>
+          <a:noFill/>
+        </p:spPr>
+      </p:pic>
+      <p:sp>
+        <p:nvSpPr>
+          <p:cNvPr id="97" name="TextBox 96"/>
+          <p:cNvSpPr txBox="1"/>
+          <p:nvPr/>
+        </p:nvSpPr>
+        <p:spPr>
+          <a:xfrm>
+            <a:off x="7215206" y="1500174"/>
+            <a:ext cx="1739579" cy="400110"/>
+          </a:xfrm>
+          <a:prstGeom prst="rect">
+            <a:avLst/>
+          </a:prstGeom>
+          <a:noFill/>
+        </p:spPr>
+        <p:txBody>
+          <a:bodyPr wrap="none" rtlCol="0">
+            <a:spAutoFit/>
+          </a:bodyPr>
+          <a:lstStyle/>
+          <a:p>
+            <a:r>
+              <a:rPr lang="en-US" sz="2000" dirty="0" smtClean="0">
+                <a:latin typeface="+mj-lt"/>
+              </a:rPr>
+              <a:t>100% </a:t>
+            </a:r>
+            <a:r>
+              <a:rPr lang="ru-RU" sz="2000" dirty="0" smtClean="0">
+                <a:latin typeface="+mj-lt"/>
+              </a:rPr>
+              <a:t>вызовов</a:t>
+            </a:r>
+            <a:endParaRPr lang="ru-RU" sz="2000" dirty="0">
+              <a:latin typeface="+mj-lt"/>
+            </a:endParaRPr>
+          </a:p>
+        </p:txBody>
+      </p:sp>
+      <p:sp>
+        <p:nvSpPr>
+          <p:cNvPr id="98" name="TextBox 97"/>
+          <p:cNvSpPr txBox="1"/>
+          <p:nvPr/>
+        </p:nvSpPr>
+        <p:spPr>
+          <a:xfrm>
+            <a:off x="3000364" y="1500174"/>
+            <a:ext cx="1732847" cy="400110"/>
+          </a:xfrm>
+          <a:prstGeom prst="rect">
+            <a:avLst/>
+          </a:prstGeom>
+          <a:noFill/>
+        </p:spPr>
+        <p:txBody>
+          <a:bodyPr wrap="square" rtlCol="0">
+            <a:spAutoFit/>
+          </a:bodyPr>
+          <a:lstStyle/>
+          <a:p>
+            <a:r>
+              <a:rPr lang="en-US" sz="2000" dirty="0" smtClean="0">
+                <a:latin typeface="+mj-lt"/>
+              </a:rPr>
+              <a:t>100% </a:t>
+            </a:r>
+            <a:r>
+              <a:rPr lang="ru-RU" sz="2000" dirty="0" smtClean="0">
+                <a:latin typeface="+mj-lt"/>
+              </a:rPr>
+              <a:t>вызовов</a:t>
+            </a:r>
+            <a:endParaRPr lang="ru-RU" sz="2000" dirty="0">
+              <a:latin typeface="+mj-lt"/>
+            </a:endParaRPr>
+          </a:p>
+        </p:txBody>
+      </p:sp>
+      <p:sp>
+        <p:nvSpPr>
+          <p:cNvPr id="99" name="TextBox 98"/>
+          <p:cNvSpPr txBox="1"/>
+          <p:nvPr/>
+        </p:nvSpPr>
+        <p:spPr>
+          <a:xfrm>
+            <a:off x="2839153" y="2500306"/>
+            <a:ext cx="1732847" cy="400110"/>
+          </a:xfrm>
+          <a:prstGeom prst="rect">
+            <a:avLst/>
+          </a:prstGeom>
+          <a:noFill/>
+        </p:spPr>
+        <p:txBody>
+          <a:bodyPr wrap="square" rtlCol="0">
+            <a:spAutoFit/>
+          </a:bodyPr>
+          <a:lstStyle/>
+          <a:p>
+            <a:r>
+              <a:rPr lang="en-US" sz="2000" dirty="0" smtClean="0">
+                <a:latin typeface="+mj-lt"/>
+              </a:rPr>
+              <a:t>100% </a:t>
+            </a:r>
+            <a:r>
+              <a:rPr lang="ru-RU" sz="2000" dirty="0" smtClean="0">
+                <a:latin typeface="+mj-lt"/>
+              </a:rPr>
+              <a:t>вызовов</a:t>
+            </a:r>
+            <a:endParaRPr lang="ru-RU" sz="2000" dirty="0">
+              <a:latin typeface="+mj-lt"/>
+            </a:endParaRPr>
+          </a:p>
+        </p:txBody>
+      </p:sp>
+      <p:sp>
+        <p:nvSpPr>
+          <p:cNvPr id="100" name="TextBox 99"/>
+          <p:cNvSpPr txBox="1"/>
+          <p:nvPr/>
+        </p:nvSpPr>
+        <p:spPr>
+          <a:xfrm>
+            <a:off x="7205969" y="2143116"/>
+            <a:ext cx="1952779" cy="400110"/>
+          </a:xfrm>
+          <a:prstGeom prst="rect">
+            <a:avLst/>
+          </a:prstGeom>
+          <a:noFill/>
+        </p:spPr>
+        <p:txBody>
+          <a:bodyPr wrap="none" rtlCol="0">
+            <a:spAutoFit/>
+          </a:bodyPr>
+          <a:lstStyle/>
+          <a:p>
+            <a:r>
+              <a:rPr lang="ru-RU" sz="2000" dirty="0" smtClean="0">
+                <a:latin typeface="+mn-lt"/>
+              </a:rPr>
+              <a:t>30-60</a:t>
+            </a:r>
+            <a:r>
+              <a:rPr lang="en-US" sz="2000" dirty="0" smtClean="0">
+                <a:latin typeface="+mn-lt"/>
+              </a:rPr>
+              <a:t>% </a:t>
+            </a:r>
+            <a:r>
+              <a:rPr lang="ru-RU" sz="2000" dirty="0" smtClean="0">
+                <a:latin typeface="+mn-lt"/>
+              </a:rPr>
+              <a:t>вызовов</a:t>
+            </a:r>
+            <a:endParaRPr lang="ru-RU" sz="2000" dirty="0">
+              <a:latin typeface="+mn-lt"/>
+            </a:endParaRPr>
+          </a:p>
+        </p:txBody>
+      </p:sp>
+      <p:sp>
+        <p:nvSpPr>
+          <p:cNvPr id="101" name="TextBox 100"/>
+          <p:cNvSpPr txBox="1"/>
+          <p:nvPr/>
+        </p:nvSpPr>
+        <p:spPr>
+          <a:xfrm>
+            <a:off x="7205969" y="3059668"/>
+            <a:ext cx="1952779" cy="400110"/>
+          </a:xfrm>
+          <a:prstGeom prst="rect">
+            <a:avLst/>
+          </a:prstGeom>
+          <a:noFill/>
+        </p:spPr>
+        <p:txBody>
+          <a:bodyPr wrap="none" rtlCol="0">
+            <a:spAutoFit/>
+          </a:bodyPr>
+          <a:lstStyle/>
+          <a:p>
+            <a:r>
+              <a:rPr lang="ru-RU" sz="2000" dirty="0" smtClean="0">
+                <a:latin typeface="+mn-lt"/>
+              </a:rPr>
+              <a:t>40-70</a:t>
+            </a:r>
+            <a:r>
+              <a:rPr lang="en-US" sz="2000" dirty="0" smtClean="0">
+                <a:latin typeface="+mn-lt"/>
+              </a:rPr>
+              <a:t>% </a:t>
+            </a:r>
+            <a:r>
+              <a:rPr lang="ru-RU" sz="2000" dirty="0" smtClean="0">
+                <a:latin typeface="+mn-lt"/>
+              </a:rPr>
+              <a:t>вызовов</a:t>
+            </a:r>
+            <a:endParaRPr lang="ru-RU" sz="2000" dirty="0">
+              <a:latin typeface="+mn-lt"/>
+            </a:endParaRPr>
+          </a:p>
+        </p:txBody>
+      </p:sp>
+      <p:pic>
+        <p:nvPicPr>
+          <p:cNvPr id="3081" name="Picture 9" descr="C:\Users\Notebook\Desktop\tunel\sibsutis\2015\dpl\diploma_submission\molumen_phone_icon.png"/>
+          <p:cNvPicPr>
+            <a:picLocks noChangeAspect="1" noChangeArrowheads="1"/>
+          </p:cNvPicPr>
+          <p:nvPr/>
+        </p:nvPicPr>
+        <p:blipFill>
+          <a:blip r:embed="rId5" cstate="print"/>
+          <a:srcRect/>
+          <a:stretch>
+            <a:fillRect/>
+          </a:stretch>
+        </p:blipFill>
+        <p:spPr bwMode="auto">
+          <a:xfrm>
+            <a:off x="1928794" y="1285860"/>
+            <a:ext cx="928694" cy="857256"/>
+          </a:xfrm>
+          <a:prstGeom prst="rect">
+            <a:avLst/>
+          </a:prstGeom>
+          <a:noFill/>
+        </p:spPr>
+      </p:pic>
+      <p:pic>
+        <p:nvPicPr>
+          <p:cNvPr id="103" name="Picture 9" descr="C:\Users\Notebook\Desktop\tunel\sibsutis\2015\dpl\diploma_submission\molumen_phone_icon.png"/>
+          <p:cNvPicPr>
+            <a:picLocks noChangeAspect="1" noChangeArrowheads="1"/>
+          </p:cNvPicPr>
+          <p:nvPr/>
+        </p:nvPicPr>
+        <p:blipFill>
+          <a:blip r:embed="rId5" cstate="print"/>
+          <a:srcRect/>
+          <a:stretch>
+            <a:fillRect/>
+          </a:stretch>
+        </p:blipFill>
+        <p:spPr bwMode="auto">
+          <a:xfrm>
+            <a:off x="6215074" y="1285860"/>
+            <a:ext cx="928694" cy="857256"/>
           </a:xfrm>
           <a:prstGeom prst="rect">
             <a:avLst/>
@@ -4796,63 +5839,221 @@
       </p:grpSpPr>
       <p:sp>
         <p:nvSpPr>
-          <p:cNvPr id="2" name="Номер слайда 1"/>
-          <p:cNvSpPr>
-            <a:spLocks noGrp="1"/>
-          </p:cNvSpPr>
-          <p:nvPr>
-            <p:ph type="sldNum" sz="quarter" idx="12"/>
-          </p:nvPr>
-        </p:nvSpPr>
-        <p:spPr/>
+          <p:cNvPr id="2" name="Заголовок 1"/>
+          <p:cNvSpPr>
+            <a:spLocks noGrp="1"/>
+          </p:cNvSpPr>
+          <p:nvPr>
+            <p:ph type="title"/>
+          </p:nvPr>
+        </p:nvSpPr>
+        <p:spPr>
+          <a:xfrm>
+            <a:off x="1214414" y="273050"/>
+            <a:ext cx="6715172" cy="706090"/>
+          </a:xfrm>
+        </p:spPr>
         <p:txBody>
           <a:bodyPr/>
           <a:lstStyle/>
           <a:p>
+            <a:r>
+              <a:rPr lang="ru-RU" dirty="0" smtClean="0"/>
+              <a:t>Обработка вызова в нерабочее время</a:t>
+            </a:r>
+            <a:endParaRPr lang="ru-RU" dirty="0"/>
+          </a:p>
+        </p:txBody>
+      </p:sp>
+      <p:sp>
+        <p:nvSpPr>
+          <p:cNvPr id="4" name="Номер слайда 3"/>
+          <p:cNvSpPr>
+            <a:spLocks noGrp="1"/>
+          </p:cNvSpPr>
+          <p:nvPr>
+            <p:ph type="sldNum" sz="quarter" idx="12"/>
+          </p:nvPr>
+        </p:nvSpPr>
+        <p:spPr/>
+        <p:txBody>
+          <a:bodyPr/>
+          <a:lstStyle/>
+          <a:p>
             <a:pPr>
               <a:defRPr/>
             </a:pPr>
-            <a:fld id="{F8C2C083-5B1A-449D-8928-55AB4BD89302}" type="slidenum">
+            <a:fld id="{BB3B5E7F-AE2F-46EF-84F8-F046D8633343}" type="slidenum">
               <a:rPr lang="ru-RU" smtClean="0"/>
               <a:pPr>
                 <a:defRPr/>
               </a:pPr>
               <a:t>4</a:t>
             </a:fld>
-            <a:endParaRPr lang="ru-RU"/>
-          </a:p>
-        </p:txBody>
-      </p:sp>
-      <p:sp>
-        <p:nvSpPr>
-          <p:cNvPr id="3" name="TextBox 2"/>
-          <p:cNvSpPr txBox="1"/>
+            <a:endParaRPr lang="ru-RU" dirty="0"/>
+          </a:p>
+        </p:txBody>
+      </p:sp>
+      <p:pic>
+        <p:nvPicPr>
+          <p:cNvPr id="4100" name="Picture 4" descr="C:\Users\Notebook\Desktop\tunel\sibsutis\2015\dpl\diploma_submission\sadg (3).png"/>
+          <p:cNvPicPr>
+            <a:picLocks noChangeAspect="1" noChangeArrowheads="1"/>
+          </p:cNvPicPr>
           <p:nvPr/>
-        </p:nvSpPr>
-        <p:spPr>
-          <a:xfrm>
-            <a:off x="214282" y="1500174"/>
-            <a:ext cx="8643998" cy="4154984"/>
+        </p:nvPicPr>
+        <p:blipFill>
+          <a:blip r:embed="rId2"/>
+          <a:srcRect/>
+          <a:stretch>
+            <a:fillRect/>
+          </a:stretch>
+        </p:blipFill>
+        <p:spPr bwMode="auto">
+          <a:xfrm>
+            <a:off x="1857356" y="1285860"/>
+            <a:ext cx="1143008" cy="3911600"/>
           </a:xfrm>
           <a:prstGeom prst="rect">
             <a:avLst/>
           </a:prstGeom>
           <a:noFill/>
         </p:spPr>
-        <p:txBody>
-          <a:bodyPr wrap="square" rtlCol="0">
+      </p:pic>
+      <p:pic>
+        <p:nvPicPr>
+          <p:cNvPr id="4101" name="Picture 5" descr="C:\Users\Notebook\Desktop\tunel\sibsutis\2015\dpl\diploma_submission\sadg (2).png"/>
+          <p:cNvPicPr>
+            <a:picLocks noChangeAspect="1" noChangeArrowheads="1"/>
+          </p:cNvPicPr>
+          <p:nvPr/>
+        </p:nvPicPr>
+        <p:blipFill>
+          <a:blip r:embed="rId3"/>
+          <a:srcRect/>
+          <a:stretch>
+            <a:fillRect/>
+          </a:stretch>
+        </p:blipFill>
+        <p:spPr bwMode="auto">
+          <a:xfrm>
+            <a:off x="5929322" y="1285860"/>
+            <a:ext cx="1574800" cy="3911600"/>
+          </a:xfrm>
+          <a:prstGeom prst="rect">
+            <a:avLst/>
+          </a:prstGeom>
+          <a:noFill/>
+        </p:spPr>
+      </p:pic>
+      <p:pic>
+        <p:nvPicPr>
+          <p:cNvPr id="15" name="Picture 9" descr="C:\Users\Notebook\Desktop\tunel\sibsutis\2015\dpl\diploma_submission\molumen_phone_icon.png"/>
+          <p:cNvPicPr>
+            <a:picLocks noChangeAspect="1" noChangeArrowheads="1"/>
+          </p:cNvPicPr>
+          <p:nvPr/>
+        </p:nvPicPr>
+        <p:blipFill>
+          <a:blip r:embed="rId4" cstate="print"/>
+          <a:srcRect/>
+          <a:stretch>
+            <a:fillRect/>
+          </a:stretch>
+        </p:blipFill>
+        <p:spPr bwMode="auto">
+          <a:xfrm>
+            <a:off x="1928794" y="1285860"/>
+            <a:ext cx="928694" cy="857256"/>
+          </a:xfrm>
+          <a:prstGeom prst="rect">
+            <a:avLst/>
+          </a:prstGeom>
+          <a:noFill/>
+        </p:spPr>
+      </p:pic>
+      <p:pic>
+        <p:nvPicPr>
+          <p:cNvPr id="16" name="Picture 9" descr="C:\Users\Notebook\Desktop\tunel\sibsutis\2015\dpl\diploma_submission\molumen_phone_icon.png"/>
+          <p:cNvPicPr>
+            <a:picLocks noChangeAspect="1" noChangeArrowheads="1"/>
+          </p:cNvPicPr>
+          <p:nvPr/>
+        </p:nvPicPr>
+        <p:blipFill>
+          <a:blip r:embed="rId4" cstate="print"/>
+          <a:srcRect/>
+          <a:stretch>
+            <a:fillRect/>
+          </a:stretch>
+        </p:blipFill>
+        <p:spPr bwMode="auto">
+          <a:xfrm>
+            <a:off x="6215074" y="1285860"/>
+            <a:ext cx="928694" cy="857256"/>
+          </a:xfrm>
+          <a:prstGeom prst="rect">
+            <a:avLst/>
+          </a:prstGeom>
+          <a:noFill/>
+        </p:spPr>
+      </p:pic>
+      <p:pic>
+        <p:nvPicPr>
+          <p:cNvPr id="4102" name="Picture 6" descr="C:\Users\Notebook\Desktop\tunel\sibsutis\2015\dpl\diploma_submission\clock-512.png"/>
+          <p:cNvPicPr>
+            <a:picLocks noChangeAspect="1" noChangeArrowheads="1"/>
+          </p:cNvPicPr>
+          <p:nvPr/>
+        </p:nvPicPr>
+        <p:blipFill>
+          <a:blip r:embed="rId5" cstate="print"/>
+          <a:srcRect/>
+          <a:stretch>
+            <a:fillRect/>
+          </a:stretch>
+        </p:blipFill>
+        <p:spPr bwMode="auto">
+          <a:xfrm>
+            <a:off x="6429388" y="3000372"/>
+            <a:ext cx="571504" cy="571504"/>
+          </a:xfrm>
+          <a:prstGeom prst="rect">
+            <a:avLst/>
+          </a:prstGeom>
+          <a:noFill/>
+        </p:spPr>
+      </p:pic>
+      <p:sp>
+        <p:nvSpPr>
+          <p:cNvPr id="18" name="Прямоугольник 17"/>
+          <p:cNvSpPr/>
+          <p:nvPr/>
+        </p:nvSpPr>
+        <p:spPr>
+          <a:xfrm>
+            <a:off x="2714620" y="1214422"/>
+            <a:ext cx="3714760" cy="1261884"/>
+          </a:xfrm>
+          <a:prstGeom prst="rect">
+            <a:avLst/>
+          </a:prstGeom>
+        </p:spPr>
+        <p:txBody>
+          <a:bodyPr wrap="square">
             <a:spAutoFit/>
           </a:bodyPr>
           <a:lstStyle/>
           <a:p>
-            <a:r>
-              <a:rPr lang="ru-RU" sz="8800" dirty="0" smtClean="0">
-                <a:latin typeface="+mn-lt"/>
-              </a:rPr>
-              <a:t>КАРТИНКА СКРИПТА ИЗ ВЕБА</a:t>
-            </a:r>
-            <a:endParaRPr lang="ru-RU" sz="8800" dirty="0">
-              <a:latin typeface="+mn-lt"/>
+            <a:pPr algn="ctr"/>
+            <a:r>
+              <a:rPr lang="ru-RU" sz="1900" dirty="0" smtClean="0">
+                <a:latin typeface="+mj-lt"/>
+              </a:rPr>
+              <a:t>Система IVR может информировать клиента о графике работы офиса компании, его расположении, схеме проезда</a:t>
+            </a:r>
+            <a:endParaRPr lang="ru-RU" sz="1900" dirty="0">
+              <a:latin typeface="+mj-lt"/>
             </a:endParaRPr>
           </a:p>
         </p:txBody>
@@ -4891,7 +6092,7 @@
       </p:grpSpPr>
       <p:sp>
         <p:nvSpPr>
-          <p:cNvPr id="2" name="Номер слайда 1"/>
+          <p:cNvPr id="4" name="Номер слайда 3"/>
           <p:cNvSpPr>
             <a:spLocks noGrp="1"/>
           </p:cNvSpPr>
@@ -4907,20 +6108,48 @@
             <a:pPr>
               <a:defRPr/>
             </a:pPr>
-            <a:fld id="{F8C2C083-5B1A-449D-8928-55AB4BD89302}" type="slidenum">
+            <a:fld id="{BB3B5E7F-AE2F-46EF-84F8-F046D8633343}" type="slidenum">
               <a:rPr lang="ru-RU" smtClean="0"/>
               <a:pPr>
                 <a:defRPr/>
               </a:pPr>
               <a:t>5</a:t>
             </a:fld>
-            <a:endParaRPr lang="ru-RU"/>
+            <a:endParaRPr lang="ru-RU" dirty="0"/>
+          </a:p>
+        </p:txBody>
+      </p:sp>
+      <p:sp>
+        <p:nvSpPr>
+          <p:cNvPr id="5" name="Заголовок 4"/>
+          <p:cNvSpPr>
+            <a:spLocks noGrp="1"/>
+          </p:cNvSpPr>
+          <p:nvPr>
+            <p:ph type="title"/>
+          </p:nvPr>
+        </p:nvSpPr>
+        <p:spPr>
+          <a:xfrm>
+            <a:off x="1285852" y="406400"/>
+            <a:ext cx="6572296" cy="400050"/>
+          </a:xfrm>
+        </p:spPr>
+        <p:txBody>
+          <a:bodyPr/>
+          <a:lstStyle/>
+          <a:p>
+            <a:r>
+              <a:rPr lang="ru-RU" dirty="0" smtClean="0"/>
+              <a:t>Функциональные блоки</a:t>
+            </a:r>
+            <a:endParaRPr lang="ru-RU" dirty="0"/>
           </a:p>
         </p:txBody>
       </p:sp>
       <p:pic>
         <p:nvPicPr>
-          <p:cNvPr id="2051" name="Picture 3" descr="C:\Users\Notebook\Desktop\tunel\sibsutis\2015\dpl\diploma_submission\getimage (2).png"/>
+          <p:cNvPr id="4099" name="Picture 3" descr="C:\Users\Notebook\Desktop\tunel\sibsutis\2015\dpl\diploma_submission\4567fg8hj-07987e5dt.png"/>
           <p:cNvPicPr>
             <a:picLocks noChangeAspect="1" noChangeArrowheads="1"/>
           </p:cNvPicPr>
@@ -4935,8 +6164,8 @@
         </p:blipFill>
         <p:spPr bwMode="auto">
           <a:xfrm>
-            <a:off x="928662" y="1285860"/>
-            <a:ext cx="7286676" cy="5083324"/>
+            <a:off x="285720" y="2214554"/>
+            <a:ext cx="9744832" cy="3857652"/>
           </a:xfrm>
           <a:prstGeom prst="rect">
             <a:avLst/>
@@ -4944,40 +6173,6 @@
           <a:noFill/>
         </p:spPr>
       </p:pic>
-      <p:sp>
-        <p:nvSpPr>
-          <p:cNvPr id="6" name="TextBox 5"/>
-          <p:cNvSpPr txBox="1"/>
-          <p:nvPr/>
-        </p:nvSpPr>
-        <p:spPr>
-          <a:xfrm>
-            <a:off x="2318914" y="214290"/>
-            <a:ext cx="4506173" cy="769441"/>
-          </a:xfrm>
-          <a:prstGeom prst="rect">
-            <a:avLst/>
-          </a:prstGeom>
-          <a:noFill/>
-        </p:spPr>
-        <p:txBody>
-          <a:bodyPr wrap="square" rtlCol="0">
-            <a:spAutoFit/>
-          </a:bodyPr>
-          <a:lstStyle/>
-          <a:p>
-            <a:r>
-              <a:rPr lang="ru-RU" sz="4400" dirty="0" smtClean="0">
-                <a:latin typeface="+mj-lt"/>
-              </a:rPr>
-              <a:t>Обработка вызова</a:t>
-            </a:r>
-            <a:endParaRPr lang="ru-RU" sz="4400" dirty="0">
-              <a:latin typeface="+mj-lt"/>
-            </a:endParaRPr>
-          </a:p>
-        </p:txBody>
-      </p:sp>
     </p:spTree>
   </p:cSld>
   <p:clrMapOvr>
@@ -5012,29 +6207,622 @@
       </p:grpSpPr>
       <p:sp>
         <p:nvSpPr>
-          <p:cNvPr id="2" name="Заголовок 1"/>
-          <p:cNvSpPr>
-            <a:spLocks noGrp="1"/>
-          </p:cNvSpPr>
-          <p:nvPr>
-            <p:ph type="ctrTitle"/>
-          </p:nvPr>
-        </p:nvSpPr>
-        <p:spPr>
-          <a:xfrm>
-            <a:off x="685800" y="2535039"/>
-            <a:ext cx="7772400" cy="1470025"/>
-          </a:xfrm>
-        </p:spPr>
+          <p:cNvPr id="2" name="Номер слайда 1"/>
+          <p:cNvSpPr>
+            <a:spLocks noGrp="1"/>
+          </p:cNvSpPr>
+          <p:nvPr>
+            <p:ph type="sldNum" sz="quarter" idx="12"/>
+          </p:nvPr>
+        </p:nvSpPr>
+        <p:spPr/>
         <p:txBody>
           <a:bodyPr/>
           <a:lstStyle/>
           <a:p>
-            <a:r>
-              <a:rPr lang="ru-RU" dirty="0" smtClean="0"/>
-              <a:t>СПАСИБО ЗА ВНИМАНИЕ!</a:t>
-            </a:r>
-            <a:endParaRPr lang="ru-RU" dirty="0"/>
+            <a:pPr>
+              <a:defRPr/>
+            </a:pPr>
+            <a:fld id="{F8C2C083-5B1A-449D-8928-55AB4BD89302}" type="slidenum">
+              <a:rPr lang="ru-RU" smtClean="0"/>
+              <a:pPr>
+                <a:defRPr/>
+              </a:pPr>
+              <a:t>6</a:t>
+            </a:fld>
+            <a:endParaRPr lang="ru-RU"/>
+          </a:p>
+        </p:txBody>
+      </p:sp>
+      <p:sp>
+        <p:nvSpPr>
+          <p:cNvPr id="13" name="TextBox 12"/>
+          <p:cNvSpPr txBox="1"/>
+          <p:nvPr/>
+        </p:nvSpPr>
+        <p:spPr>
+          <a:xfrm>
+            <a:off x="2856093" y="317500"/>
+            <a:ext cx="3582807" cy="584775"/>
+          </a:xfrm>
+          <a:prstGeom prst="rect">
+            <a:avLst/>
+          </a:prstGeom>
+          <a:noFill/>
+        </p:spPr>
+        <p:txBody>
+          <a:bodyPr wrap="square" rtlCol="0">
+            <a:spAutoFit/>
+          </a:bodyPr>
+          <a:lstStyle/>
+          <a:p>
+            <a:r>
+              <a:rPr lang="ru-RU" sz="3200" dirty="0" smtClean="0">
+                <a:latin typeface="+mj-lt"/>
+              </a:rPr>
+              <a:t>Уровни обработки</a:t>
+            </a:r>
+            <a:endParaRPr lang="ru-RU" sz="3200" dirty="0">
+              <a:latin typeface="+mj-lt"/>
+            </a:endParaRPr>
+          </a:p>
+        </p:txBody>
+      </p:sp>
+      <p:pic>
+        <p:nvPicPr>
+          <p:cNvPr id="2052" name="Picture 4" descr="C:\Users\Notebook\Desktop\tunel\sibsutis\2015\dpl\diploma_submission\Неназванная Диаграмма.png"/>
+          <p:cNvPicPr>
+            <a:picLocks noChangeAspect="1" noChangeArrowheads="1"/>
+          </p:cNvPicPr>
+          <p:nvPr/>
+        </p:nvPicPr>
+        <p:blipFill>
+          <a:blip r:embed="rId2"/>
+          <a:srcRect/>
+          <a:stretch>
+            <a:fillRect/>
+          </a:stretch>
+        </p:blipFill>
+        <p:spPr bwMode="auto">
+          <a:xfrm>
+            <a:off x="428596" y="1285860"/>
+            <a:ext cx="8286808" cy="4960275"/>
+          </a:xfrm>
+          <a:prstGeom prst="rect">
+            <a:avLst/>
+          </a:prstGeom>
+          <a:noFill/>
+        </p:spPr>
+      </p:pic>
+    </p:spTree>
+  </p:cSld>
+  <p:clrMapOvr>
+    <a:masterClrMapping/>
+  </p:clrMapOvr>
+  <p:timing>
+    <p:tnLst>
+      <p:par>
+        <p:cTn id="1" dur="indefinite" restart="never" nodeType="tmRoot"/>
+      </p:par>
+    </p:tnLst>
+  </p:timing>
+</p:sld>
+</file>
+
+<file path=ppt/slides/slide7.xml><?xml version="1.0" encoding="utf-8"?>
+<p:sld xmlns:a="http://schemas.openxmlformats.org/drawingml/2006/main" xmlns:r="http://schemas.openxmlformats.org/officeDocument/2006/relationships" xmlns:p="http://schemas.openxmlformats.org/presentationml/2006/main">
+  <p:cSld>
+    <p:spTree>
+      <p:nvGrpSpPr>
+        <p:cNvPr id="1" name=""/>
+        <p:cNvGrpSpPr/>
+        <p:nvPr/>
+      </p:nvGrpSpPr>
+      <p:grpSpPr>
+        <a:xfrm>
+          <a:off x="0" y="0"/>
+          <a:ext cx="0" cy="0"/>
+          <a:chOff x="0" y="0"/>
+          <a:chExt cx="0" cy="0"/>
+        </a:xfrm>
+      </p:grpSpPr>
+      <p:sp>
+        <p:nvSpPr>
+          <p:cNvPr id="2" name="Номер слайда 1"/>
+          <p:cNvSpPr>
+            <a:spLocks noGrp="1"/>
+          </p:cNvSpPr>
+          <p:nvPr>
+            <p:ph type="sldNum" sz="quarter" idx="12"/>
+          </p:nvPr>
+        </p:nvSpPr>
+        <p:spPr/>
+        <p:txBody>
+          <a:bodyPr/>
+          <a:lstStyle/>
+          <a:p>
+            <a:pPr>
+              <a:defRPr/>
+            </a:pPr>
+            <a:fld id="{F8C2C083-5B1A-449D-8928-55AB4BD89302}" type="slidenum">
+              <a:rPr lang="ru-RU" smtClean="0"/>
+              <a:pPr>
+                <a:defRPr/>
+              </a:pPr>
+              <a:t>7</a:t>
+            </a:fld>
+            <a:endParaRPr lang="ru-RU"/>
+          </a:p>
+        </p:txBody>
+      </p:sp>
+      <p:pic>
+        <p:nvPicPr>
+          <p:cNvPr id="2051" name="Picture 3" descr="C:\Users\Notebook\Desktop\tunel\sibsutis\2015\dpl\diploma_submission\IVR_redactor\Screenshot from 2015-05-17 14_54_21.png"/>
+          <p:cNvPicPr>
+            <a:picLocks noChangeAspect="1" noChangeArrowheads="1"/>
+          </p:cNvPicPr>
+          <p:nvPr/>
+        </p:nvPicPr>
+        <p:blipFill>
+          <a:blip r:embed="rId2"/>
+          <a:srcRect/>
+          <a:stretch>
+            <a:fillRect/>
+          </a:stretch>
+        </p:blipFill>
+        <p:spPr bwMode="auto">
+          <a:xfrm>
+            <a:off x="1775664" y="1571612"/>
+            <a:ext cx="1777149" cy="4786346"/>
+          </a:xfrm>
+          <a:prstGeom prst="rect">
+            <a:avLst/>
+          </a:prstGeom>
+          <a:noFill/>
+        </p:spPr>
+      </p:pic>
+      <p:sp>
+        <p:nvSpPr>
+          <p:cNvPr id="5" name="TextBox 4"/>
+          <p:cNvSpPr txBox="1"/>
+          <p:nvPr/>
+        </p:nvSpPr>
+        <p:spPr>
+          <a:xfrm>
+            <a:off x="2460909" y="139700"/>
+            <a:ext cx="4222181" cy="1077218"/>
+          </a:xfrm>
+          <a:prstGeom prst="rect">
+            <a:avLst/>
+          </a:prstGeom>
+          <a:noFill/>
+        </p:spPr>
+        <p:txBody>
+          <a:bodyPr wrap="square" rtlCol="0">
+            <a:spAutoFit/>
+          </a:bodyPr>
+          <a:lstStyle/>
+          <a:p>
+            <a:pPr algn="ctr">
+              <a:spcBef>
+                <a:spcPts val="0"/>
+              </a:spcBef>
+              <a:spcAft>
+                <a:spcPts val="0"/>
+              </a:spcAft>
+            </a:pPr>
+            <a:r>
+              <a:rPr lang="ru-RU" sz="3200" dirty="0" smtClean="0">
+                <a:latin typeface="+mj-lt"/>
+              </a:rPr>
+              <a:t>Пример:</a:t>
+            </a:r>
+          </a:p>
+          <a:p>
+            <a:pPr>
+              <a:spcBef>
+                <a:spcPts val="0"/>
+              </a:spcBef>
+              <a:spcAft>
+                <a:spcPts val="0"/>
+              </a:spcAft>
+            </a:pPr>
+            <a:r>
+              <a:rPr lang="ru-RU" sz="3200" dirty="0" smtClean="0">
+                <a:latin typeface="+mj-lt"/>
+              </a:rPr>
+              <a:t>Приветствие </a:t>
+            </a:r>
+            <a:r>
+              <a:rPr lang="ru-RU" sz="3200" dirty="0" smtClean="0">
+                <a:latin typeface="+mj-lt"/>
+              </a:rPr>
+              <a:t>компании</a:t>
+            </a:r>
+            <a:endParaRPr lang="ru-RU" sz="3200" dirty="0">
+              <a:latin typeface="+mj-lt"/>
+            </a:endParaRPr>
+          </a:p>
+        </p:txBody>
+      </p:sp>
+      <p:sp>
+        <p:nvSpPr>
+          <p:cNvPr id="9" name="Прямоугольная выноска 8"/>
+          <p:cNvSpPr/>
+          <p:nvPr/>
+        </p:nvSpPr>
+        <p:spPr>
+          <a:xfrm>
+            <a:off x="3929058" y="5643578"/>
+            <a:ext cx="3929090" cy="500066"/>
+          </a:xfrm>
+          <a:prstGeom prst="wedgeRectCallout">
+            <a:avLst>
+              <a:gd name="adj1" fmla="val -62764"/>
+              <a:gd name="adj2" fmla="val -991"/>
+            </a:avLst>
+          </a:prstGeom>
+        </p:spPr>
+        <p:style>
+          <a:lnRef idx="2">
+            <a:schemeClr val="dk1"/>
+          </a:lnRef>
+          <a:fillRef idx="1">
+            <a:schemeClr val="lt1"/>
+          </a:fillRef>
+          <a:effectRef idx="0">
+            <a:schemeClr val="dk1"/>
+          </a:effectRef>
+          <a:fontRef idx="minor">
+            <a:schemeClr val="dk1"/>
+          </a:fontRef>
+        </p:style>
+        <p:txBody>
+          <a:bodyPr rtlCol="0" anchor="ctr"/>
+          <a:lstStyle/>
+          <a:p>
+            <a:pPr algn="ctr"/>
+            <a:r>
+              <a:rPr lang="ru-RU" sz="1900" dirty="0" smtClean="0"/>
+              <a:t>Вызов </a:t>
+            </a:r>
+            <a:r>
+              <a:rPr lang="ru-RU" sz="1900" dirty="0" err="1" smtClean="0"/>
+              <a:t>оператора\секретаря</a:t>
+            </a:r>
+            <a:endParaRPr lang="ru-RU" sz="1900" dirty="0"/>
+          </a:p>
+        </p:txBody>
+      </p:sp>
+      <p:sp>
+        <p:nvSpPr>
+          <p:cNvPr id="8" name="Прямоугольная выноска 7"/>
+          <p:cNvSpPr/>
+          <p:nvPr/>
+        </p:nvSpPr>
+        <p:spPr>
+          <a:xfrm>
+            <a:off x="3929058" y="1714488"/>
+            <a:ext cx="3929090" cy="500066"/>
+          </a:xfrm>
+          <a:prstGeom prst="wedgeRectCallout">
+            <a:avLst>
+              <a:gd name="adj1" fmla="val -62764"/>
+              <a:gd name="adj2" fmla="val -991"/>
+            </a:avLst>
+          </a:prstGeom>
+        </p:spPr>
+        <p:style>
+          <a:lnRef idx="2">
+            <a:schemeClr val="dk1"/>
+          </a:lnRef>
+          <a:fillRef idx="1">
+            <a:schemeClr val="lt1"/>
+          </a:fillRef>
+          <a:effectRef idx="0">
+            <a:schemeClr val="dk1"/>
+          </a:effectRef>
+          <a:fontRef idx="minor">
+            <a:schemeClr val="dk1"/>
+          </a:fontRef>
+        </p:style>
+        <p:txBody>
+          <a:bodyPr rtlCol="0" anchor="ctr"/>
+          <a:lstStyle/>
+          <a:p>
+            <a:pPr algn="ctr"/>
+            <a:r>
+              <a:rPr lang="ru-RU" sz="1900" dirty="0" smtClean="0"/>
+              <a:t>Проиграть КПВ (гудки).</a:t>
+            </a:r>
+            <a:endParaRPr lang="ru-RU" sz="1900" dirty="0"/>
+          </a:p>
+        </p:txBody>
+      </p:sp>
+      <p:sp>
+        <p:nvSpPr>
+          <p:cNvPr id="10" name="Прямоугольная выноска 9"/>
+          <p:cNvSpPr/>
+          <p:nvPr/>
+        </p:nvSpPr>
+        <p:spPr>
+          <a:xfrm>
+            <a:off x="3929058" y="3643314"/>
+            <a:ext cx="3929090" cy="500066"/>
+          </a:xfrm>
+          <a:prstGeom prst="wedgeRectCallout">
+            <a:avLst>
+              <a:gd name="adj1" fmla="val -62764"/>
+              <a:gd name="adj2" fmla="val -991"/>
+            </a:avLst>
+          </a:prstGeom>
+        </p:spPr>
+        <p:style>
+          <a:lnRef idx="2">
+            <a:schemeClr val="dk1"/>
+          </a:lnRef>
+          <a:fillRef idx="1">
+            <a:schemeClr val="lt1"/>
+          </a:fillRef>
+          <a:effectRef idx="0">
+            <a:schemeClr val="dk1"/>
+          </a:effectRef>
+          <a:fontRef idx="minor">
+            <a:schemeClr val="dk1"/>
+          </a:fontRef>
+        </p:style>
+        <p:txBody>
+          <a:bodyPr rtlCol="0" anchor="ctr"/>
+          <a:lstStyle/>
+          <a:p>
+            <a:pPr algn="ctr"/>
+            <a:r>
+              <a:rPr lang="ru-RU" sz="1900" dirty="0" smtClean="0"/>
+              <a:t>Проиграть приветствие компании</a:t>
+            </a:r>
+            <a:endParaRPr lang="ru-RU" sz="1900" dirty="0"/>
+          </a:p>
+        </p:txBody>
+      </p:sp>
+    </p:spTree>
+  </p:cSld>
+  <p:clrMapOvr>
+    <a:masterClrMapping/>
+  </p:clrMapOvr>
+  <p:timing>
+    <p:tnLst>
+      <p:par>
+        <p:cTn id="1" dur="indefinite" restart="never" nodeType="tmRoot"/>
+      </p:par>
+    </p:tnLst>
+  </p:timing>
+</p:sld>
+</file>
+
+<file path=ppt/slides/slide8.xml><?xml version="1.0" encoding="utf-8"?>
+<p:sld xmlns:a="http://schemas.openxmlformats.org/drawingml/2006/main" xmlns:r="http://schemas.openxmlformats.org/officeDocument/2006/relationships" xmlns:p="http://schemas.openxmlformats.org/presentationml/2006/main">
+  <p:cSld>
+    <p:spTree>
+      <p:nvGrpSpPr>
+        <p:cNvPr id="1" name=""/>
+        <p:cNvGrpSpPr/>
+        <p:nvPr/>
+      </p:nvGrpSpPr>
+      <p:grpSpPr>
+        <a:xfrm>
+          <a:off x="0" y="0"/>
+          <a:ext cx="0" cy="0"/>
+          <a:chOff x="0" y="0"/>
+          <a:chExt cx="0" cy="0"/>
+        </a:xfrm>
+      </p:grpSpPr>
+      <p:sp>
+        <p:nvSpPr>
+          <p:cNvPr id="2" name="Номер слайда 1"/>
+          <p:cNvSpPr>
+            <a:spLocks noGrp="1"/>
+          </p:cNvSpPr>
+          <p:nvPr>
+            <p:ph type="sldNum" sz="quarter" idx="12"/>
+          </p:nvPr>
+        </p:nvSpPr>
+        <p:spPr/>
+        <p:txBody>
+          <a:bodyPr/>
+          <a:lstStyle/>
+          <a:p>
+            <a:pPr>
+              <a:defRPr/>
+            </a:pPr>
+            <a:fld id="{F8C2C083-5B1A-449D-8928-55AB4BD89302}" type="slidenum">
+              <a:rPr lang="ru-RU" smtClean="0"/>
+              <a:pPr>
+                <a:defRPr/>
+              </a:pPr>
+              <a:t>8</a:t>
+            </a:fld>
+            <a:endParaRPr lang="ru-RU"/>
+          </a:p>
+        </p:txBody>
+      </p:sp>
+      <p:pic>
+        <p:nvPicPr>
+          <p:cNvPr id="2051" name="Picture 3" descr="C:\Users\Notebook\Desktop\tunel\sibsutis\2015\dpl\diploma_submission\getimage (2).png"/>
+          <p:cNvPicPr>
+            <a:picLocks noChangeAspect="1" noChangeArrowheads="1"/>
+          </p:cNvPicPr>
+          <p:nvPr/>
+        </p:nvPicPr>
+        <p:blipFill>
+          <a:blip r:embed="rId2"/>
+          <a:srcRect/>
+          <a:stretch>
+            <a:fillRect/>
+          </a:stretch>
+        </p:blipFill>
+        <p:spPr bwMode="auto">
+          <a:xfrm>
+            <a:off x="928662" y="1285860"/>
+            <a:ext cx="7286676" cy="5083324"/>
+          </a:xfrm>
+          <a:prstGeom prst="rect">
+            <a:avLst/>
+          </a:prstGeom>
+          <a:noFill/>
+        </p:spPr>
+      </p:pic>
+      <p:sp>
+        <p:nvSpPr>
+          <p:cNvPr id="6" name="TextBox 5"/>
+          <p:cNvSpPr txBox="1"/>
+          <p:nvPr/>
+        </p:nvSpPr>
+        <p:spPr>
+          <a:xfrm>
+            <a:off x="2909671" y="317500"/>
+            <a:ext cx="3324657" cy="584775"/>
+          </a:xfrm>
+          <a:prstGeom prst="rect">
+            <a:avLst/>
+          </a:prstGeom>
+          <a:noFill/>
+        </p:spPr>
+        <p:txBody>
+          <a:bodyPr wrap="square" rtlCol="0">
+            <a:spAutoFit/>
+          </a:bodyPr>
+          <a:lstStyle/>
+          <a:p>
+            <a:r>
+              <a:rPr lang="ru-RU" sz="3200" dirty="0" smtClean="0">
+                <a:latin typeface="+mj-lt"/>
+              </a:rPr>
+              <a:t>Обработка вызова</a:t>
+            </a:r>
+            <a:endParaRPr lang="ru-RU" sz="3200" dirty="0">
+              <a:latin typeface="+mj-lt"/>
+            </a:endParaRPr>
+          </a:p>
+        </p:txBody>
+      </p:sp>
+    </p:spTree>
+  </p:cSld>
+  <p:clrMapOvr>
+    <a:masterClrMapping/>
+  </p:clrMapOvr>
+  <p:timing>
+    <p:tnLst>
+      <p:par>
+        <p:cTn id="1" dur="indefinite" restart="never" nodeType="tmRoot"/>
+      </p:par>
+    </p:tnLst>
+  </p:timing>
+</p:sld>
+</file>
+
+<file path=ppt/slides/slide9.xml><?xml version="1.0" encoding="utf-8"?>
+<p:sld xmlns:a="http://schemas.openxmlformats.org/drawingml/2006/main" xmlns:r="http://schemas.openxmlformats.org/officeDocument/2006/relationships" xmlns:p="http://schemas.openxmlformats.org/presentationml/2006/main">
+  <p:cSld>
+    <p:spTree>
+      <p:nvGrpSpPr>
+        <p:cNvPr id="1" name=""/>
+        <p:cNvGrpSpPr/>
+        <p:nvPr/>
+      </p:nvGrpSpPr>
+      <p:grpSpPr>
+        <a:xfrm>
+          <a:off x="0" y="0"/>
+          <a:ext cx="0" cy="0"/>
+          <a:chOff x="0" y="0"/>
+          <a:chExt cx="0" cy="0"/>
+        </a:xfrm>
+      </p:grpSpPr>
+      <p:sp>
+        <p:nvSpPr>
+          <p:cNvPr id="2" name="Номер слайда 1"/>
+          <p:cNvSpPr>
+            <a:spLocks noGrp="1"/>
+          </p:cNvSpPr>
+          <p:nvPr>
+            <p:ph type="sldNum" sz="quarter" idx="12"/>
+          </p:nvPr>
+        </p:nvSpPr>
+        <p:spPr/>
+        <p:txBody>
+          <a:bodyPr/>
+          <a:lstStyle/>
+          <a:p>
+            <a:pPr>
+              <a:defRPr/>
+            </a:pPr>
+            <a:fld id="{F8C2C083-5B1A-449D-8928-55AB4BD89302}" type="slidenum">
+              <a:rPr lang="ru-RU" smtClean="0"/>
+              <a:pPr>
+                <a:defRPr/>
+              </a:pPr>
+              <a:t>9</a:t>
+            </a:fld>
+            <a:endParaRPr lang="ru-RU"/>
+          </a:p>
+        </p:txBody>
+      </p:sp>
+      <p:pic>
+        <p:nvPicPr>
+          <p:cNvPr id="3077" name="Picture 5" descr="C:\Users\Notebook\Desktop\tunel\sibsutis\2015\dpl\diploma_submission\IVR_redactor\Screenshot from 2015-05-17 14_58_37.png"/>
+          <p:cNvPicPr>
+            <a:picLocks noChangeAspect="1" noChangeArrowheads="1"/>
+          </p:cNvPicPr>
+          <p:nvPr/>
+        </p:nvPicPr>
+        <p:blipFill>
+          <a:blip r:embed="rId2"/>
+          <a:srcRect/>
+          <a:stretch>
+            <a:fillRect/>
+          </a:stretch>
+        </p:blipFill>
+        <p:spPr bwMode="auto">
+          <a:xfrm>
+            <a:off x="-137628" y="1142983"/>
+            <a:ext cx="9638850" cy="5003191"/>
+          </a:xfrm>
+          <a:prstGeom prst="rect">
+            <a:avLst/>
+          </a:prstGeom>
+          <a:noFill/>
+        </p:spPr>
+      </p:pic>
+      <p:sp>
+        <p:nvSpPr>
+          <p:cNvPr id="7" name="TextBox 6"/>
+          <p:cNvSpPr txBox="1"/>
+          <p:nvPr/>
+        </p:nvSpPr>
+        <p:spPr>
+          <a:xfrm>
+            <a:off x="3137736" y="317500"/>
+            <a:ext cx="2868528" cy="584775"/>
+          </a:xfrm>
+          <a:prstGeom prst="rect">
+            <a:avLst/>
+          </a:prstGeom>
+          <a:noFill/>
+        </p:spPr>
+        <p:txBody>
+          <a:bodyPr wrap="square" rtlCol="0">
+            <a:spAutoFit/>
+          </a:bodyPr>
+          <a:lstStyle/>
+          <a:p>
+            <a:r>
+              <a:rPr lang="ru-RU" sz="3200" dirty="0" err="1" smtClean="0">
+                <a:latin typeface="+mj-lt"/>
+              </a:rPr>
+              <a:t>Автосекретарь</a:t>
+            </a:r>
+            <a:endParaRPr lang="ru-RU" sz="3200" dirty="0">
+              <a:latin typeface="+mj-lt"/>
+            </a:endParaRPr>
           </a:p>
         </p:txBody>
       </p:sp>

</xml_diff>